<commit_message>
watchdoc v2 is added.
</commit_message>
<xml_diff>
--- a/Notebooks/English/02 - Objects and data structures/01-Numbers.pptx
+++ b/Notebooks/English/02 - Objects and data structures/01-Numbers.pptx
@@ -7,43 +7,6 @@
   <p:sldIdLst>
     <p:sldId id="256" r:id="rId2"/>
     <p:sldId id="257" r:id="rId3"/>
-    <p:sldId id="258" r:id="rId8"/>
-    <p:sldId id="259" r:id="rId9"/>
-    <p:sldId id="260" r:id="rId10"/>
-    <p:sldId id="261" r:id="rId11"/>
-    <p:sldId id="262" r:id="rId12"/>
-    <p:sldId id="263" r:id="rId13"/>
-    <p:sldId id="264" r:id="rId14"/>
-    <p:sldId id="265" r:id="rId15"/>
-    <p:sldId id="266" r:id="rId16"/>
-    <p:sldId id="267" r:id="rId17"/>
-    <p:sldId id="268" r:id="rId18"/>
-    <p:sldId id="269" r:id="rId19"/>
-    <p:sldId id="270" r:id="rId20"/>
-    <p:sldId id="271" r:id="rId21"/>
-    <p:sldId id="272" r:id="rId22"/>
-    <p:sldId id="273" r:id="rId23"/>
-    <p:sldId id="274" r:id="rId24"/>
-    <p:sldId id="275" r:id="rId25"/>
-    <p:sldId id="276" r:id="rId26"/>
-    <p:sldId id="277" r:id="rId27"/>
-    <p:sldId id="278" r:id="rId28"/>
-    <p:sldId id="279" r:id="rId29"/>
-    <p:sldId id="280" r:id="rId30"/>
-    <p:sldId id="281" r:id="rId31"/>
-    <p:sldId id="282" r:id="rId32"/>
-    <p:sldId id="283" r:id="rId33"/>
-    <p:sldId id="284" r:id="rId34"/>
-    <p:sldId id="285" r:id="rId35"/>
-    <p:sldId id="286" r:id="rId36"/>
-    <p:sldId id="287" r:id="rId37"/>
-    <p:sldId id="288" r:id="rId38"/>
-    <p:sldId id="289" r:id="rId39"/>
-    <p:sldId id="290" r:id="rId40"/>
-    <p:sldId id="291" r:id="rId41"/>
-    <p:sldId id="292" r:id="rId42"/>
-    <p:sldId id="293" r:id="rId43"/>
-    <p:sldId id="294" r:id="rId44"/>
   </p:sldIdLst>
   <p:sldSz cx="9144000" cy="5143500" type="screen16x9"/>
   <p:notesSz cx="6858000" cy="9144000"/>
@@ -3158,589 +3121,6 @@
 </p:sld>
 </file>
 
-<file path=ppt/slides/slide10.xml><?xml version="1.0" encoding="utf-8"?>
-<p:sld xmlns:a="http://schemas.openxmlformats.org/drawingml/2006/main" xmlns:p="http://schemas.openxmlformats.org/presentationml/2006/main" xmlns:r="http://schemas.openxmlformats.org/officeDocument/2006/relationships">
-  <p:cSld>
-    <p:spTree>
-      <p:nvGrpSpPr>
-        <p:cNvPr id="1" name=""/>
-        <p:cNvGrpSpPr/>
-        <p:nvPr/>
-      </p:nvGrpSpPr>
-      <p:grpSpPr/>
-      <p:sp>
-        <p:nvSpPr>
-          <p:cNvPr id="2" name="TextBox 1"/>
-          <p:cNvSpPr txBox="1"/>
-          <p:nvPr/>
-        </p:nvSpPr>
-        <p:spPr>
-          <a:xfrm>
-            <a:off x="914400" y="914400"/>
-            <a:ext cx="914400" cy="914400"/>
-          </a:xfrm>
-          <a:prstGeom prst="rect">
-            <a:avLst/>
-          </a:prstGeom>
-          <a:noFill/>
-        </p:spPr>
-        <p:txBody>
-          <a:bodyPr wrap="none">
-            <a:spAutoFit/>
-          </a:bodyPr>
-          <a:lstStyle/>
-          <a:p>
-            <a:r>
-              <a:t>Python Code: </a:t>
-            </a:r>
-          </a:p>
-          <a:p>
-            <a:pPr>
-              <a:defRPr sz="1200"/>
-            </a:pPr>
-            <a:r>
-              <a:t>``` # Addition</a:t>
-            </a:r>
-            <a:br/>
-            <a:r>
-              <a:t> `````` 2+1 ```</a:t>
-            </a:r>
-            <a:br/>
-          </a:p>
-        </p:txBody>
-      </p:sp>
-    </p:spTree>
-  </p:cSld>
-  <p:clrMapOvr>
-    <a:masterClrMapping/>
-  </p:clrMapOvr>
-</p:sld>
-</file>
-
-<file path=ppt/slides/slide11.xml><?xml version="1.0" encoding="utf-8"?>
-<p:sld xmlns:a="http://schemas.openxmlformats.org/drawingml/2006/main" xmlns:p="http://schemas.openxmlformats.org/presentationml/2006/main" xmlns:r="http://schemas.openxmlformats.org/officeDocument/2006/relationships">
-  <p:cSld>
-    <p:spTree>
-      <p:nvGrpSpPr>
-        <p:cNvPr id="1" name=""/>
-        <p:cNvGrpSpPr/>
-        <p:nvPr/>
-      </p:nvGrpSpPr>
-      <p:grpSpPr/>
-      <p:sp>
-        <p:nvSpPr>
-          <p:cNvPr id="2" name="TextBox 1"/>
-          <p:cNvSpPr txBox="1"/>
-          <p:nvPr/>
-        </p:nvSpPr>
-        <p:spPr>
-          <a:xfrm>
-            <a:off x="914400" y="914400"/>
-            <a:ext cx="914400" cy="914400"/>
-          </a:xfrm>
-          <a:prstGeom prst="rect">
-            <a:avLst/>
-          </a:prstGeom>
-          <a:noFill/>
-        </p:spPr>
-        <p:txBody>
-          <a:bodyPr wrap="none">
-            <a:spAutoFit/>
-          </a:bodyPr>
-          <a:lstStyle/>
-          <a:p>
-            <a:r>
-              <a:t>Python Code: </a:t>
-            </a:r>
-          </a:p>
-          <a:p>
-            <a:pPr>
-              <a:defRPr sz="1200"/>
-            </a:pPr>
-            <a:r>
-              <a:t>``` # Subtraction</a:t>
-            </a:r>
-            <a:br/>
-            <a:r>
-              <a:t> `````` 2-1 ```</a:t>
-            </a:r>
-            <a:br/>
-          </a:p>
-        </p:txBody>
-      </p:sp>
-    </p:spTree>
-  </p:cSld>
-  <p:clrMapOvr>
-    <a:masterClrMapping/>
-  </p:clrMapOvr>
-</p:sld>
-</file>
-
-<file path=ppt/slides/slide12.xml><?xml version="1.0" encoding="utf-8"?>
-<p:sld xmlns:a="http://schemas.openxmlformats.org/drawingml/2006/main" xmlns:p="http://schemas.openxmlformats.org/presentationml/2006/main" xmlns:r="http://schemas.openxmlformats.org/officeDocument/2006/relationships">
-  <p:cSld>
-    <p:spTree>
-      <p:nvGrpSpPr>
-        <p:cNvPr id="1" name=""/>
-        <p:cNvGrpSpPr/>
-        <p:nvPr/>
-      </p:nvGrpSpPr>
-      <p:grpSpPr/>
-      <p:sp>
-        <p:nvSpPr>
-          <p:cNvPr id="2" name="TextBox 1"/>
-          <p:cNvSpPr txBox="1"/>
-          <p:nvPr/>
-        </p:nvSpPr>
-        <p:spPr>
-          <a:xfrm>
-            <a:off x="914400" y="914400"/>
-            <a:ext cx="914400" cy="914400"/>
-          </a:xfrm>
-          <a:prstGeom prst="rect">
-            <a:avLst/>
-          </a:prstGeom>
-          <a:noFill/>
-        </p:spPr>
-        <p:txBody>
-          <a:bodyPr wrap="none">
-            <a:spAutoFit/>
-          </a:bodyPr>
-          <a:lstStyle/>
-          <a:p>
-            <a:r>
-              <a:t>Python Code: </a:t>
-            </a:r>
-          </a:p>
-          <a:p>
-            <a:pPr>
-              <a:defRPr sz="1200"/>
-            </a:pPr>
-            <a:r>
-              <a:t>``` # Multiplication</a:t>
-            </a:r>
-            <a:br/>
-            <a:r>
-              <a:t> `````` 2*2 ```</a:t>
-            </a:r>
-            <a:br/>
-          </a:p>
-        </p:txBody>
-      </p:sp>
-    </p:spTree>
-  </p:cSld>
-  <p:clrMapOvr>
-    <a:masterClrMapping/>
-  </p:clrMapOvr>
-</p:sld>
-</file>
-
-<file path=ppt/slides/slide13.xml><?xml version="1.0" encoding="utf-8"?>
-<p:sld xmlns:a="http://schemas.openxmlformats.org/drawingml/2006/main" xmlns:p="http://schemas.openxmlformats.org/presentationml/2006/main" xmlns:r="http://schemas.openxmlformats.org/officeDocument/2006/relationships">
-  <p:cSld>
-    <p:spTree>
-      <p:nvGrpSpPr>
-        <p:cNvPr id="1" name=""/>
-        <p:cNvGrpSpPr/>
-        <p:nvPr/>
-      </p:nvGrpSpPr>
-      <p:grpSpPr/>
-      <p:sp>
-        <p:nvSpPr>
-          <p:cNvPr id="2" name="TextBox 1"/>
-          <p:cNvSpPr txBox="1"/>
-          <p:nvPr/>
-        </p:nvSpPr>
-        <p:spPr>
-          <a:xfrm>
-            <a:off x="914400" y="914400"/>
-            <a:ext cx="914400" cy="914400"/>
-          </a:xfrm>
-          <a:prstGeom prst="rect">
-            <a:avLst/>
-          </a:prstGeom>
-          <a:noFill/>
-        </p:spPr>
-        <p:txBody>
-          <a:bodyPr wrap="none">
-            <a:spAutoFit/>
-          </a:bodyPr>
-          <a:lstStyle/>
-          <a:p>
-            <a:r>
-              <a:t>Python Code: </a:t>
-            </a:r>
-          </a:p>
-          <a:p>
-            <a:pPr>
-              <a:defRPr sz="1200"/>
-            </a:pPr>
-            <a:r>
-              <a:t>``` # Division</a:t>
-            </a:r>
-            <a:br/>
-            <a:r>
-              <a:t> `````` 3/2 ```</a:t>
-            </a:r>
-            <a:br/>
-          </a:p>
-        </p:txBody>
-      </p:sp>
-    </p:spTree>
-  </p:cSld>
-  <p:clrMapOvr>
-    <a:masterClrMapping/>
-  </p:clrMapOvr>
-</p:sld>
-</file>
-
-<file path=ppt/slides/slide14.xml><?xml version="1.0" encoding="utf-8"?>
-<p:sld xmlns:a="http://schemas.openxmlformats.org/drawingml/2006/main" xmlns:p="http://schemas.openxmlformats.org/presentationml/2006/main" xmlns:r="http://schemas.openxmlformats.org/officeDocument/2006/relationships">
-  <p:cSld>
-    <p:spTree>
-      <p:nvGrpSpPr>
-        <p:cNvPr id="1" name=""/>
-        <p:cNvGrpSpPr/>
-        <p:nvPr/>
-      </p:nvGrpSpPr>
-      <p:grpSpPr/>
-      <p:sp>
-        <p:nvSpPr>
-          <p:cNvPr id="2" name="TextBox 1"/>
-          <p:cNvSpPr txBox="1"/>
-          <p:nvPr/>
-        </p:nvSpPr>
-        <p:spPr>
-          <a:xfrm>
-            <a:off x="914400" y="914400"/>
-            <a:ext cx="914400" cy="914400"/>
-          </a:xfrm>
-          <a:prstGeom prst="rect">
-            <a:avLst/>
-          </a:prstGeom>
-          <a:noFill/>
-        </p:spPr>
-        <p:txBody>
-          <a:bodyPr wrap="none">
-            <a:spAutoFit/>
-          </a:bodyPr>
-          <a:lstStyle/>
-          <a:p>
-            <a:r>
-              <a:t>Python Code: </a:t>
-            </a:r>
-          </a:p>
-          <a:p>
-            <a:pPr>
-              <a:defRPr sz="1200"/>
-            </a:pPr>
-            <a:r>
-              <a:t>``` # Floor Division</a:t>
-            </a:r>
-            <a:br/>
-            <a:r>
-              <a:t> `````` 7//4 ```</a:t>
-            </a:r>
-            <a:br/>
-          </a:p>
-        </p:txBody>
-      </p:sp>
-    </p:spTree>
-  </p:cSld>
-  <p:clrMapOvr>
-    <a:masterClrMapping/>
-  </p:clrMapOvr>
-</p:sld>
-</file>
-
-<file path=ppt/slides/slide15.xml><?xml version="1.0" encoding="utf-8"?>
-<p:sld xmlns:a="http://schemas.openxmlformats.org/drawingml/2006/main" xmlns:p="http://schemas.openxmlformats.org/presentationml/2006/main" xmlns:r="http://schemas.openxmlformats.org/officeDocument/2006/relationships">
-  <p:cSld>
-    <p:spTree>
-      <p:nvGrpSpPr>
-        <p:cNvPr id="1" name=""/>
-        <p:cNvGrpSpPr/>
-        <p:nvPr/>
-      </p:nvGrpSpPr>
-      <p:grpSpPr/>
-      <p:sp>
-        <p:nvSpPr>
-          <p:cNvPr id="2" name="TextBox 1"/>
-          <p:cNvSpPr txBox="1"/>
-          <p:nvPr/>
-        </p:nvSpPr>
-        <p:spPr>
-          <a:xfrm>
-            <a:off x="914400" y="914400"/>
-            <a:ext cx="914400" cy="914400"/>
-          </a:xfrm>
-          <a:prstGeom prst="rect">
-            <a:avLst/>
-          </a:prstGeom>
-          <a:noFill/>
-        </p:spPr>
-        <p:txBody>
-          <a:bodyPr wrap="none">
-            <a:spAutoFit/>
-          </a:bodyPr>
-          <a:lstStyle/>
-          <a:p>
-            <a:r>
-              <a:t>Info:</a:t>
-            </a:r>
-          </a:p>
-          <a:p>
-            <a:pPr>
-              <a:defRPr sz="1200"/>
-            </a:pPr>
-            <a:r>
-              <a:t>**Whoa! What just happened? Last time I checked, 7 divided by 4 equals 1.75 not 1!**</a:t>
-            </a:r>
-            <a:br/>
-            <a:br/>
-            <a:r>
-              <a:t>The reason we get this result is because we are using "*floor*" division. The // operator (two forward slashes) truncates the decimal without rounding, and returns an integer result.</a:t>
-            </a:r>
-            <a:br/>
-          </a:p>
-        </p:txBody>
-      </p:sp>
-    </p:spTree>
-  </p:cSld>
-  <p:clrMapOvr>
-    <a:masterClrMapping/>
-  </p:clrMapOvr>
-</p:sld>
-</file>
-
-<file path=ppt/slides/slide16.xml><?xml version="1.0" encoding="utf-8"?>
-<p:sld xmlns:a="http://schemas.openxmlformats.org/drawingml/2006/main" xmlns:p="http://schemas.openxmlformats.org/presentationml/2006/main" xmlns:r="http://schemas.openxmlformats.org/officeDocument/2006/relationships">
-  <p:cSld>
-    <p:spTree>
-      <p:nvGrpSpPr>
-        <p:cNvPr id="1" name=""/>
-        <p:cNvGrpSpPr/>
-        <p:nvPr/>
-      </p:nvGrpSpPr>
-      <p:grpSpPr/>
-      <p:sp>
-        <p:nvSpPr>
-          <p:cNvPr id="2" name="TextBox 1"/>
-          <p:cNvSpPr txBox="1"/>
-          <p:nvPr/>
-        </p:nvSpPr>
-        <p:spPr>
-          <a:xfrm>
-            <a:off x="914400" y="914400"/>
-            <a:ext cx="914400" cy="914400"/>
-          </a:xfrm>
-          <a:prstGeom prst="rect">
-            <a:avLst/>
-          </a:prstGeom>
-          <a:noFill/>
-        </p:spPr>
-        <p:txBody>
-          <a:bodyPr wrap="none">
-            <a:spAutoFit/>
-          </a:bodyPr>
-          <a:lstStyle/>
-          <a:p>
-            <a:r>
-              <a:t>Info:</a:t>
-            </a:r>
-          </a:p>
-          <a:p>
-            <a:pPr>
-              <a:defRPr sz="1200"/>
-            </a:pPr>
-            <a:r>
-              <a:t>**So what if we just want the remainder after division?**</a:t>
-            </a:r>
-            <a:br/>
-          </a:p>
-        </p:txBody>
-      </p:sp>
-    </p:spTree>
-  </p:cSld>
-  <p:clrMapOvr>
-    <a:masterClrMapping/>
-  </p:clrMapOvr>
-</p:sld>
-</file>
-
-<file path=ppt/slides/slide17.xml><?xml version="1.0" encoding="utf-8"?>
-<p:sld xmlns:a="http://schemas.openxmlformats.org/drawingml/2006/main" xmlns:p="http://schemas.openxmlformats.org/presentationml/2006/main" xmlns:r="http://schemas.openxmlformats.org/officeDocument/2006/relationships">
-  <p:cSld>
-    <p:spTree>
-      <p:nvGrpSpPr>
-        <p:cNvPr id="1" name=""/>
-        <p:cNvGrpSpPr/>
-        <p:nvPr/>
-      </p:nvGrpSpPr>
-      <p:grpSpPr/>
-      <p:sp>
-        <p:nvSpPr>
-          <p:cNvPr id="2" name="TextBox 1"/>
-          <p:cNvSpPr txBox="1"/>
-          <p:nvPr/>
-        </p:nvSpPr>
-        <p:spPr>
-          <a:xfrm>
-            <a:off x="914400" y="914400"/>
-            <a:ext cx="914400" cy="914400"/>
-          </a:xfrm>
-          <a:prstGeom prst="rect">
-            <a:avLst/>
-          </a:prstGeom>
-          <a:noFill/>
-        </p:spPr>
-        <p:txBody>
-          <a:bodyPr wrap="none">
-            <a:spAutoFit/>
-          </a:bodyPr>
-          <a:lstStyle/>
-          <a:p>
-            <a:r>
-              <a:t>Python Code: </a:t>
-            </a:r>
-          </a:p>
-          <a:p>
-            <a:pPr>
-              <a:defRPr sz="1200"/>
-            </a:pPr>
-            <a:r>
-              <a:t>``` # Modulo</a:t>
-            </a:r>
-            <a:br/>
-            <a:r>
-              <a:t> `````` 7%4 ```</a:t>
-            </a:r>
-            <a:br/>
-          </a:p>
-        </p:txBody>
-      </p:sp>
-    </p:spTree>
-  </p:cSld>
-  <p:clrMapOvr>
-    <a:masterClrMapping/>
-  </p:clrMapOvr>
-</p:sld>
-</file>
-
-<file path=ppt/slides/slide18.xml><?xml version="1.0" encoding="utf-8"?>
-<p:sld xmlns:a="http://schemas.openxmlformats.org/drawingml/2006/main" xmlns:p="http://schemas.openxmlformats.org/presentationml/2006/main" xmlns:r="http://schemas.openxmlformats.org/officeDocument/2006/relationships">
-  <p:cSld>
-    <p:spTree>
-      <p:nvGrpSpPr>
-        <p:cNvPr id="1" name=""/>
-        <p:cNvGrpSpPr/>
-        <p:nvPr/>
-      </p:nvGrpSpPr>
-      <p:grpSpPr/>
-      <p:sp>
-        <p:nvSpPr>
-          <p:cNvPr id="2" name="TextBox 1"/>
-          <p:cNvSpPr txBox="1"/>
-          <p:nvPr/>
-        </p:nvSpPr>
-        <p:spPr>
-          <a:xfrm>
-            <a:off x="914400" y="914400"/>
-            <a:ext cx="914400" cy="914400"/>
-          </a:xfrm>
-          <a:prstGeom prst="rect">
-            <a:avLst/>
-          </a:prstGeom>
-          <a:noFill/>
-        </p:spPr>
-        <p:txBody>
-          <a:bodyPr wrap="none">
-            <a:spAutoFit/>
-          </a:bodyPr>
-          <a:lstStyle/>
-          <a:p>
-            <a:r>
-              <a:t>Info:</a:t>
-            </a:r>
-          </a:p>
-          <a:p>
-            <a:pPr>
-              <a:defRPr sz="1200"/>
-            </a:pPr>
-            <a:r>
-              <a:t>4 goes into 7 once, with a remainder of 3. The % operator returns the remainder after division.</a:t>
-            </a:r>
-            <a:br/>
-          </a:p>
-        </p:txBody>
-      </p:sp>
-    </p:spTree>
-  </p:cSld>
-  <p:clrMapOvr>
-    <a:masterClrMapping/>
-  </p:clrMapOvr>
-</p:sld>
-</file>
-
-<file path=ppt/slides/slide19.xml><?xml version="1.0" encoding="utf-8"?>
-<p:sld xmlns:a="http://schemas.openxmlformats.org/drawingml/2006/main" xmlns:p="http://schemas.openxmlformats.org/presentationml/2006/main" xmlns:r="http://schemas.openxmlformats.org/officeDocument/2006/relationships">
-  <p:cSld>
-    <p:spTree>
-      <p:nvGrpSpPr>
-        <p:cNvPr id="1" name=""/>
-        <p:cNvGrpSpPr/>
-        <p:nvPr/>
-      </p:nvGrpSpPr>
-      <p:grpSpPr/>
-      <p:sp>
-        <p:nvSpPr>
-          <p:cNvPr id="2" name="TextBox 1"/>
-          <p:cNvSpPr txBox="1"/>
-          <p:nvPr/>
-        </p:nvSpPr>
-        <p:spPr>
-          <a:xfrm>
-            <a:off x="914400" y="914400"/>
-            <a:ext cx="914400" cy="914400"/>
-          </a:xfrm>
-          <a:prstGeom prst="rect">
-            <a:avLst/>
-          </a:prstGeom>
-          <a:noFill/>
-        </p:spPr>
-        <p:txBody>
-          <a:bodyPr wrap="none">
-            <a:spAutoFit/>
-          </a:bodyPr>
-          <a:lstStyle/>
-          <a:p>
-            <a:r>
-              <a:t>Python Code: </a:t>
-            </a:r>
-          </a:p>
-          <a:p>
-            <a:pPr>
-              <a:defRPr sz="1200"/>
-            </a:pPr>
-            <a:r>
-              <a:t>``` # Complexer Calculations</a:t>
-            </a:r>
-            <a:br/>
-            <a:r>
-              <a:t> `````` (5*4)+(2*10)+(10/10) ```</a:t>
-            </a:r>
-            <a:br/>
-          </a:p>
-        </p:txBody>
-      </p:sp>
-    </p:spTree>
-  </p:cSld>
-  <p:clrMapOvr>
-    <a:masterClrMapping/>
-  </p:clrMapOvr>
-</p:sld>
-</file>
-
 <file path=ppt/slides/slide2.xml><?xml version="1.0" encoding="utf-8"?>
 <p:sld xmlns:a="http://schemas.openxmlformats.org/drawingml/2006/main" xmlns:r="http://schemas.openxmlformats.org/officeDocument/2006/relationships" xmlns:p="http://schemas.openxmlformats.org/presentationml/2006/main">
   <p:cSld>
@@ -5393,1726 +4773,6 @@
       </p:sp>
     </p:spTree>
   </p:cSld>
-</p:sld>
-</file>
-
-<file path=ppt/slides/slide20.xml><?xml version="1.0" encoding="utf-8"?>
-<p:sld xmlns:a="http://schemas.openxmlformats.org/drawingml/2006/main" xmlns:p="http://schemas.openxmlformats.org/presentationml/2006/main" xmlns:r="http://schemas.openxmlformats.org/officeDocument/2006/relationships">
-  <p:cSld>
-    <p:spTree>
-      <p:nvGrpSpPr>
-        <p:cNvPr id="1" name=""/>
-        <p:cNvGrpSpPr/>
-        <p:nvPr/>
-      </p:nvGrpSpPr>
-      <p:grpSpPr/>
-      <p:sp>
-        <p:nvSpPr>
-          <p:cNvPr id="2" name="TextBox 1"/>
-          <p:cNvSpPr txBox="1"/>
-          <p:nvPr/>
-        </p:nvSpPr>
-        <p:spPr>
-          <a:xfrm>
-            <a:off x="914400" y="914400"/>
-            <a:ext cx="914400" cy="914400"/>
-          </a:xfrm>
-          <a:prstGeom prst="rect">
-            <a:avLst/>
-          </a:prstGeom>
-          <a:noFill/>
-        </p:spPr>
-        <p:txBody>
-          <a:bodyPr wrap="none">
-            <a:spAutoFit/>
-          </a:bodyPr>
-          <a:lstStyle/>
-          <a:p>
-            <a:r>
-              <a:t>Info:</a:t>
-            </a:r>
-          </a:p>
-          <a:p>
-            <a:pPr>
-              <a:defRPr sz="1200"/>
-            </a:pPr>
-            <a:r>
-              <a:t>### Arithmetic continued</a:t>
-            </a:r>
-            <a:br/>
-          </a:p>
-        </p:txBody>
-      </p:sp>
-    </p:spTree>
-  </p:cSld>
-  <p:clrMapOvr>
-    <a:masterClrMapping/>
-  </p:clrMapOvr>
-</p:sld>
-</file>
-
-<file path=ppt/slides/slide21.xml><?xml version="1.0" encoding="utf-8"?>
-<p:sld xmlns:a="http://schemas.openxmlformats.org/drawingml/2006/main" xmlns:p="http://schemas.openxmlformats.org/presentationml/2006/main" xmlns:r="http://schemas.openxmlformats.org/officeDocument/2006/relationships">
-  <p:cSld>
-    <p:spTree>
-      <p:nvGrpSpPr>
-        <p:cNvPr id="1" name=""/>
-        <p:cNvGrpSpPr/>
-        <p:nvPr/>
-      </p:nvGrpSpPr>
-      <p:grpSpPr/>
-      <p:sp>
-        <p:nvSpPr>
-          <p:cNvPr id="2" name="TextBox 1"/>
-          <p:cNvSpPr txBox="1"/>
-          <p:nvPr/>
-        </p:nvSpPr>
-        <p:spPr>
-          <a:xfrm>
-            <a:off x="914400" y="914400"/>
-            <a:ext cx="914400" cy="914400"/>
-          </a:xfrm>
-          <a:prstGeom prst="rect">
-            <a:avLst/>
-          </a:prstGeom>
-          <a:noFill/>
-        </p:spPr>
-        <p:txBody>
-          <a:bodyPr wrap="none">
-            <a:spAutoFit/>
-          </a:bodyPr>
-          <a:lstStyle/>
-          <a:p>
-            <a:r>
-              <a:t>Python Code: </a:t>
-            </a:r>
-          </a:p>
-          <a:p>
-            <a:pPr>
-              <a:defRPr sz="1200"/>
-            </a:pPr>
-            <a:r>
-              <a:t>``` # Powers</a:t>
-            </a:r>
-            <a:br/>
-            <a:r>
-              <a:t> `````` 2**3 ```</a:t>
-            </a:r>
-            <a:br/>
-          </a:p>
-        </p:txBody>
-      </p:sp>
-    </p:spTree>
-  </p:cSld>
-  <p:clrMapOvr>
-    <a:masterClrMapping/>
-  </p:clrMapOvr>
-</p:sld>
-</file>
-
-<file path=ppt/slides/slide22.xml><?xml version="1.0" encoding="utf-8"?>
-<p:sld xmlns:a="http://schemas.openxmlformats.org/drawingml/2006/main" xmlns:p="http://schemas.openxmlformats.org/presentationml/2006/main" xmlns:r="http://schemas.openxmlformats.org/officeDocument/2006/relationships">
-  <p:cSld>
-    <p:spTree>
-      <p:nvGrpSpPr>
-        <p:cNvPr id="1" name=""/>
-        <p:cNvGrpSpPr/>
-        <p:nvPr/>
-      </p:nvGrpSpPr>
-      <p:grpSpPr/>
-      <p:sp>
-        <p:nvSpPr>
-          <p:cNvPr id="2" name="TextBox 1"/>
-          <p:cNvSpPr txBox="1"/>
-          <p:nvPr/>
-        </p:nvSpPr>
-        <p:spPr>
-          <a:xfrm>
-            <a:off x="914400" y="914400"/>
-            <a:ext cx="914400" cy="914400"/>
-          </a:xfrm>
-          <a:prstGeom prst="rect">
-            <a:avLst/>
-          </a:prstGeom>
-          <a:noFill/>
-        </p:spPr>
-        <p:txBody>
-          <a:bodyPr wrap="none">
-            <a:spAutoFit/>
-          </a:bodyPr>
-          <a:lstStyle/>
-          <a:p>
-            <a:r>
-              <a:t>Python Code: </a:t>
-            </a:r>
-          </a:p>
-          <a:p>
-            <a:pPr>
-              <a:defRPr sz="1200"/>
-            </a:pPr>
-            <a:r>
-              <a:t>``` # Can also do roots this way</a:t>
-            </a:r>
-            <a:br/>
-            <a:r>
-              <a:t> `````` 4**0.5 ```</a:t>
-            </a:r>
-            <a:br/>
-          </a:p>
-        </p:txBody>
-      </p:sp>
-    </p:spTree>
-  </p:cSld>
-  <p:clrMapOvr>
-    <a:masterClrMapping/>
-  </p:clrMapOvr>
-</p:sld>
-</file>
-
-<file path=ppt/slides/slide23.xml><?xml version="1.0" encoding="utf-8"?>
-<p:sld xmlns:a="http://schemas.openxmlformats.org/drawingml/2006/main" xmlns:p="http://schemas.openxmlformats.org/presentationml/2006/main" xmlns:r="http://schemas.openxmlformats.org/officeDocument/2006/relationships">
-  <p:cSld>
-    <p:spTree>
-      <p:nvGrpSpPr>
-        <p:cNvPr id="1" name=""/>
-        <p:cNvGrpSpPr/>
-        <p:nvPr/>
-      </p:nvGrpSpPr>
-      <p:grpSpPr/>
-      <p:sp>
-        <p:nvSpPr>
-          <p:cNvPr id="2" name="TextBox 1"/>
-          <p:cNvSpPr txBox="1"/>
-          <p:nvPr/>
-        </p:nvSpPr>
-        <p:spPr>
-          <a:xfrm>
-            <a:off x="914400" y="914400"/>
-            <a:ext cx="914400" cy="914400"/>
-          </a:xfrm>
-          <a:prstGeom prst="rect">
-            <a:avLst/>
-          </a:prstGeom>
-          <a:noFill/>
-        </p:spPr>
-        <p:txBody>
-          <a:bodyPr wrap="none">
-            <a:spAutoFit/>
-          </a:bodyPr>
-          <a:lstStyle/>
-          <a:p>
-            <a:r>
-              <a:t>Python Code: </a:t>
-            </a:r>
-          </a:p>
-          <a:p>
-            <a:pPr>
-              <a:defRPr sz="1200"/>
-            </a:pPr>
-            <a:r>
-              <a:t>``` # Order of Operations followed in Python</a:t>
-            </a:r>
-            <a:br/>
-            <a:r>
-              <a:t> `````` 2 + 10 * 10 + 3 ```</a:t>
-            </a:r>
-            <a:br/>
-          </a:p>
-        </p:txBody>
-      </p:sp>
-    </p:spTree>
-  </p:cSld>
-  <p:clrMapOvr>
-    <a:masterClrMapping/>
-  </p:clrMapOvr>
-</p:sld>
-</file>
-
-<file path=ppt/slides/slide24.xml><?xml version="1.0" encoding="utf-8"?>
-<p:sld xmlns:a="http://schemas.openxmlformats.org/drawingml/2006/main" xmlns:p="http://schemas.openxmlformats.org/presentationml/2006/main" xmlns:r="http://schemas.openxmlformats.org/officeDocument/2006/relationships">
-  <p:cSld>
-    <p:spTree>
-      <p:nvGrpSpPr>
-        <p:cNvPr id="1" name=""/>
-        <p:cNvGrpSpPr/>
-        <p:nvPr/>
-      </p:nvGrpSpPr>
-      <p:grpSpPr/>
-      <p:sp>
-        <p:nvSpPr>
-          <p:cNvPr id="2" name="TextBox 1"/>
-          <p:cNvSpPr txBox="1"/>
-          <p:nvPr/>
-        </p:nvSpPr>
-        <p:spPr>
-          <a:xfrm>
-            <a:off x="914400" y="914400"/>
-            <a:ext cx="914400" cy="914400"/>
-          </a:xfrm>
-          <a:prstGeom prst="rect">
-            <a:avLst/>
-          </a:prstGeom>
-          <a:noFill/>
-        </p:spPr>
-        <p:txBody>
-          <a:bodyPr wrap="none">
-            <a:spAutoFit/>
-          </a:bodyPr>
-          <a:lstStyle/>
-          <a:p>
-            <a:r>
-              <a:t>Python Code: </a:t>
-            </a:r>
-          </a:p>
-          <a:p>
-            <a:pPr>
-              <a:defRPr sz="1200"/>
-            </a:pPr>
-            <a:r>
-              <a:t>``` # Can use parentheses to specify orders</a:t>
-            </a:r>
-            <a:br/>
-            <a:r>
-              <a:t> `````` (2+10) * (10+3) ```</a:t>
-            </a:r>
-            <a:br/>
-          </a:p>
-        </p:txBody>
-      </p:sp>
-    </p:spTree>
-  </p:cSld>
-  <p:clrMapOvr>
-    <a:masterClrMapping/>
-  </p:clrMapOvr>
-</p:sld>
-</file>
-
-<file path=ppt/slides/slide25.xml><?xml version="1.0" encoding="utf-8"?>
-<p:sld xmlns:a="http://schemas.openxmlformats.org/drawingml/2006/main" xmlns:p="http://schemas.openxmlformats.org/presentationml/2006/main" xmlns:r="http://schemas.openxmlformats.org/officeDocument/2006/relationships">
-  <p:cSld>
-    <p:spTree>
-      <p:nvGrpSpPr>
-        <p:cNvPr id="1" name=""/>
-        <p:cNvGrpSpPr/>
-        <p:nvPr/>
-      </p:nvGrpSpPr>
-      <p:grpSpPr/>
-      <p:sp>
-        <p:nvSpPr>
-          <p:cNvPr id="2" name="TextBox 1"/>
-          <p:cNvSpPr txBox="1"/>
-          <p:nvPr/>
-        </p:nvSpPr>
-        <p:spPr>
-          <a:xfrm>
-            <a:off x="914400" y="914400"/>
-            <a:ext cx="914400" cy="914400"/>
-          </a:xfrm>
-          <a:prstGeom prst="rect">
-            <a:avLst/>
-          </a:prstGeom>
-          <a:noFill/>
-        </p:spPr>
-        <p:txBody>
-          <a:bodyPr wrap="none">
-            <a:spAutoFit/>
-          </a:bodyPr>
-          <a:lstStyle/>
-          <a:p>
-            <a:r>
-              <a:t>Info:</a:t>
-            </a:r>
-          </a:p>
-          <a:p>
-            <a:pPr>
-              <a:defRPr sz="1200"/>
-            </a:pPr>
-            <a:r>
-              <a:t>## Variable Assignments</a:t>
-            </a:r>
-            <a:br/>
-            <a:br/>
-            <a:r>
-              <a:t>Now that we've seen how to use numbers in Python as a calculator let's see how we can assign names and create variables.</a:t>
-            </a:r>
-            <a:br/>
-            <a:br/>
-            <a:r>
-              <a:t>We use a single equals sign to assign labels to variables. Let's see a few examples of how we can do this.</a:t>
-            </a:r>
-            <a:br/>
-          </a:p>
-        </p:txBody>
-      </p:sp>
-    </p:spTree>
-  </p:cSld>
-  <p:clrMapOvr>
-    <a:masterClrMapping/>
-  </p:clrMapOvr>
-</p:sld>
-</file>
-
-<file path=ppt/slides/slide26.xml><?xml version="1.0" encoding="utf-8"?>
-<p:sld xmlns:a="http://schemas.openxmlformats.org/drawingml/2006/main" xmlns:p="http://schemas.openxmlformats.org/presentationml/2006/main" xmlns:r="http://schemas.openxmlformats.org/officeDocument/2006/relationships">
-  <p:cSld>
-    <p:spTree>
-      <p:nvGrpSpPr>
-        <p:cNvPr id="1" name=""/>
-        <p:cNvGrpSpPr/>
-        <p:nvPr/>
-      </p:nvGrpSpPr>
-      <p:grpSpPr/>
-      <p:sp>
-        <p:nvSpPr>
-          <p:cNvPr id="2" name="TextBox 1"/>
-          <p:cNvSpPr txBox="1"/>
-          <p:nvPr/>
-        </p:nvSpPr>
-        <p:spPr>
-          <a:xfrm>
-            <a:off x="914400" y="914400"/>
-            <a:ext cx="914400" cy="914400"/>
-          </a:xfrm>
-          <a:prstGeom prst="rect">
-            <a:avLst/>
-          </a:prstGeom>
-          <a:noFill/>
-        </p:spPr>
-        <p:txBody>
-          <a:bodyPr wrap="none">
-            <a:spAutoFit/>
-          </a:bodyPr>
-          <a:lstStyle/>
-          <a:p>
-            <a:r>
-              <a:t>Python Code: </a:t>
-            </a:r>
-          </a:p>
-          <a:p>
-            <a:pPr>
-              <a:defRPr sz="1200"/>
-            </a:pPr>
-            <a:r>
-              <a:t>``` # Let's create an object called "a" and assign it the number 5</a:t>
-            </a:r>
-            <a:br/>
-            <a:r>
-              <a:t> `````` a = 5 ```</a:t>
-            </a:r>
-            <a:br/>
-          </a:p>
-        </p:txBody>
-      </p:sp>
-    </p:spTree>
-  </p:cSld>
-  <p:clrMapOvr>
-    <a:masterClrMapping/>
-  </p:clrMapOvr>
-</p:sld>
-</file>
-
-<file path=ppt/slides/slide27.xml><?xml version="1.0" encoding="utf-8"?>
-<p:sld xmlns:a="http://schemas.openxmlformats.org/drawingml/2006/main" xmlns:p="http://schemas.openxmlformats.org/presentationml/2006/main" xmlns:r="http://schemas.openxmlformats.org/officeDocument/2006/relationships">
-  <p:cSld>
-    <p:spTree>
-      <p:nvGrpSpPr>
-        <p:cNvPr id="1" name=""/>
-        <p:cNvGrpSpPr/>
-        <p:nvPr/>
-      </p:nvGrpSpPr>
-      <p:grpSpPr/>
-      <p:sp>
-        <p:nvSpPr>
-          <p:cNvPr id="2" name="TextBox 1"/>
-          <p:cNvSpPr txBox="1"/>
-          <p:nvPr/>
-        </p:nvSpPr>
-        <p:spPr>
-          <a:xfrm>
-            <a:off x="914400" y="914400"/>
-            <a:ext cx="914400" cy="914400"/>
-          </a:xfrm>
-          <a:prstGeom prst="rect">
-            <a:avLst/>
-          </a:prstGeom>
-          <a:noFill/>
-        </p:spPr>
-        <p:txBody>
-          <a:bodyPr wrap="none">
-            <a:spAutoFit/>
-          </a:bodyPr>
-          <a:lstStyle/>
-          <a:p>
-            <a:r>
-              <a:t>Info:</a:t>
-            </a:r>
-          </a:p>
-          <a:p>
-            <a:pPr>
-              <a:defRPr sz="1200"/>
-            </a:pPr>
-            <a:r>
-              <a:t>Now if I call *a* in my Python script, Python will treat it as the number 5.</a:t>
-            </a:r>
-            <a:br/>
-          </a:p>
-        </p:txBody>
-      </p:sp>
-    </p:spTree>
-  </p:cSld>
-  <p:clrMapOvr>
-    <a:masterClrMapping/>
-  </p:clrMapOvr>
-</p:sld>
-</file>
-
-<file path=ppt/slides/slide28.xml><?xml version="1.0" encoding="utf-8"?>
-<p:sld xmlns:a="http://schemas.openxmlformats.org/drawingml/2006/main" xmlns:p="http://schemas.openxmlformats.org/presentationml/2006/main" xmlns:r="http://schemas.openxmlformats.org/officeDocument/2006/relationships">
-  <p:cSld>
-    <p:spTree>
-      <p:nvGrpSpPr>
-        <p:cNvPr id="1" name=""/>
-        <p:cNvGrpSpPr/>
-        <p:nvPr/>
-      </p:nvGrpSpPr>
-      <p:grpSpPr/>
-      <p:sp>
-        <p:nvSpPr>
-          <p:cNvPr id="2" name="TextBox 1"/>
-          <p:cNvSpPr txBox="1"/>
-          <p:nvPr/>
-        </p:nvSpPr>
-        <p:spPr>
-          <a:xfrm>
-            <a:off x="914400" y="914400"/>
-            <a:ext cx="914400" cy="914400"/>
-          </a:xfrm>
-          <a:prstGeom prst="rect">
-            <a:avLst/>
-          </a:prstGeom>
-          <a:noFill/>
-        </p:spPr>
-        <p:txBody>
-          <a:bodyPr wrap="none">
-            <a:spAutoFit/>
-          </a:bodyPr>
-          <a:lstStyle/>
-          <a:p>
-            <a:r>
-              <a:t>Python Code: </a:t>
-            </a:r>
-          </a:p>
-          <a:p>
-            <a:pPr>
-              <a:defRPr sz="1200"/>
-            </a:pPr>
-            <a:r>
-              <a:t>``` # Adding the objects</a:t>
-            </a:r>
-            <a:br/>
-            <a:r>
-              <a:t> `````` a+a ```</a:t>
-            </a:r>
-            <a:br/>
-          </a:p>
-        </p:txBody>
-      </p:sp>
-    </p:spTree>
-  </p:cSld>
-  <p:clrMapOvr>
-    <a:masterClrMapping/>
-  </p:clrMapOvr>
-</p:sld>
-</file>
-
-<file path=ppt/slides/slide29.xml><?xml version="1.0" encoding="utf-8"?>
-<p:sld xmlns:a="http://schemas.openxmlformats.org/drawingml/2006/main" xmlns:p="http://schemas.openxmlformats.org/presentationml/2006/main" xmlns:r="http://schemas.openxmlformats.org/officeDocument/2006/relationships">
-  <p:cSld>
-    <p:spTree>
-      <p:nvGrpSpPr>
-        <p:cNvPr id="1" name=""/>
-        <p:cNvGrpSpPr/>
-        <p:nvPr/>
-      </p:nvGrpSpPr>
-      <p:grpSpPr/>
-      <p:sp>
-        <p:nvSpPr>
-          <p:cNvPr id="2" name="TextBox 1"/>
-          <p:cNvSpPr txBox="1"/>
-          <p:nvPr/>
-        </p:nvSpPr>
-        <p:spPr>
-          <a:xfrm>
-            <a:off x="914400" y="914400"/>
-            <a:ext cx="914400" cy="914400"/>
-          </a:xfrm>
-          <a:prstGeom prst="rect">
-            <a:avLst/>
-          </a:prstGeom>
-          <a:noFill/>
-        </p:spPr>
-        <p:txBody>
-          <a:bodyPr wrap="none">
-            <a:spAutoFit/>
-          </a:bodyPr>
-          <a:lstStyle/>
-          <a:p>
-            <a:r>
-              <a:t>Info:</a:t>
-            </a:r>
-          </a:p>
-          <a:p>
-            <a:pPr>
-              <a:defRPr sz="1200"/>
-            </a:pPr>
-            <a:r>
-              <a:t>What happens on reassignment? Will Python let us write it over?</a:t>
-            </a:r>
-            <a:br/>
-          </a:p>
-        </p:txBody>
-      </p:sp>
-    </p:spTree>
-  </p:cSld>
-  <p:clrMapOvr>
-    <a:masterClrMapping/>
-  </p:clrMapOvr>
-</p:sld>
-</file>
-
-<file path=ppt/slides/slide3.xml><?xml version="1.0" encoding="utf-8"?>
-<p:sld xmlns:a="http://schemas.openxmlformats.org/drawingml/2006/main" xmlns:p="http://schemas.openxmlformats.org/presentationml/2006/main" xmlns:r="http://schemas.openxmlformats.org/officeDocument/2006/relationships">
-  <p:cSld>
-    <p:spTree>
-      <p:nvGrpSpPr>
-        <p:cNvPr id="1" name=""/>
-        <p:cNvGrpSpPr/>
-        <p:nvPr/>
-      </p:nvGrpSpPr>
-      <p:grpSpPr/>
-      <p:pic>
-        <p:nvPicPr>
-          <p:cNvPr id="2" name="Picture 1" descr="IntecHeader.png"/>
-          <p:cNvPicPr>
-            <a:picLocks noChangeAspect="1"/>
-          </p:cNvPicPr>
-          <p:nvPr/>
-        </p:nvPicPr>
-        <p:blipFill>
-          <a:blip r:embed="rId2"/>
-          <a:stretch>
-            <a:fillRect/>
-          </a:stretch>
-        </p:blipFill>
-        <p:spPr>
-          <a:xfrm>
-            <a:off x="914400" y="914400"/>
-            <a:ext cx="5105400" cy="1346200"/>
-          </a:xfrm>
-          <a:prstGeom prst="rect">
-            <a:avLst/>
-          </a:prstGeom>
-        </p:spPr>
-      </p:pic>
-    </p:spTree>
-  </p:cSld>
-  <p:clrMapOvr>
-    <a:masterClrMapping/>
-  </p:clrMapOvr>
-</p:sld>
-</file>
-
-<file path=ppt/slides/slide30.xml><?xml version="1.0" encoding="utf-8"?>
-<p:sld xmlns:a="http://schemas.openxmlformats.org/drawingml/2006/main" xmlns:p="http://schemas.openxmlformats.org/presentationml/2006/main" xmlns:r="http://schemas.openxmlformats.org/officeDocument/2006/relationships">
-  <p:cSld>
-    <p:spTree>
-      <p:nvGrpSpPr>
-        <p:cNvPr id="1" name=""/>
-        <p:cNvGrpSpPr/>
-        <p:nvPr/>
-      </p:nvGrpSpPr>
-      <p:grpSpPr/>
-      <p:sp>
-        <p:nvSpPr>
-          <p:cNvPr id="2" name="TextBox 1"/>
-          <p:cNvSpPr txBox="1"/>
-          <p:nvPr/>
-        </p:nvSpPr>
-        <p:spPr>
-          <a:xfrm>
-            <a:off x="914400" y="914400"/>
-            <a:ext cx="914400" cy="914400"/>
-          </a:xfrm>
-          <a:prstGeom prst="rect">
-            <a:avLst/>
-          </a:prstGeom>
-          <a:noFill/>
-        </p:spPr>
-        <p:txBody>
-          <a:bodyPr wrap="none">
-            <a:spAutoFit/>
-          </a:bodyPr>
-          <a:lstStyle/>
-          <a:p>
-            <a:r>
-              <a:t>Python Code: </a:t>
-            </a:r>
-          </a:p>
-          <a:p>
-            <a:pPr>
-              <a:defRPr sz="1200"/>
-            </a:pPr>
-            <a:r>
-              <a:t>``` # Reassignment</a:t>
-            </a:r>
-            <a:br/>
-            <a:r>
-              <a:t> `````` a = 10 ```</a:t>
-            </a:r>
-            <a:br/>
-          </a:p>
-        </p:txBody>
-      </p:sp>
-    </p:spTree>
-  </p:cSld>
-  <p:clrMapOvr>
-    <a:masterClrMapping/>
-  </p:clrMapOvr>
-</p:sld>
-</file>
-
-<file path=ppt/slides/slide31.xml><?xml version="1.0" encoding="utf-8"?>
-<p:sld xmlns:a="http://schemas.openxmlformats.org/drawingml/2006/main" xmlns:p="http://schemas.openxmlformats.org/presentationml/2006/main" xmlns:r="http://schemas.openxmlformats.org/officeDocument/2006/relationships">
-  <p:cSld>
-    <p:spTree>
-      <p:nvGrpSpPr>
-        <p:cNvPr id="1" name=""/>
-        <p:cNvGrpSpPr/>
-        <p:nvPr/>
-      </p:nvGrpSpPr>
-      <p:grpSpPr/>
-      <p:sp>
-        <p:nvSpPr>
-          <p:cNvPr id="2" name="TextBox 1"/>
-          <p:cNvSpPr txBox="1"/>
-          <p:nvPr/>
-        </p:nvSpPr>
-        <p:spPr>
-          <a:xfrm>
-            <a:off x="914400" y="914400"/>
-            <a:ext cx="914400" cy="914400"/>
-          </a:xfrm>
-          <a:prstGeom prst="rect">
-            <a:avLst/>
-          </a:prstGeom>
-          <a:noFill/>
-        </p:spPr>
-        <p:txBody>
-          <a:bodyPr wrap="none">
-            <a:spAutoFit/>
-          </a:bodyPr>
-          <a:lstStyle/>
-          <a:p>
-            <a:r>
-              <a:t>Python Code: </a:t>
-            </a:r>
-          </a:p>
-          <a:p>
-            <a:pPr>
-              <a:defRPr sz="1200"/>
-            </a:pPr>
-            <a:r>
-              <a:t>``` # Check</a:t>
-            </a:r>
-            <a:br/>
-            <a:r>
-              <a:t> `````` a ```</a:t>
-            </a:r>
-            <a:br/>
-          </a:p>
-        </p:txBody>
-      </p:sp>
-    </p:spTree>
-  </p:cSld>
-  <p:clrMapOvr>
-    <a:masterClrMapping/>
-  </p:clrMapOvr>
-</p:sld>
-</file>
-
-<file path=ppt/slides/slide32.xml><?xml version="1.0" encoding="utf-8"?>
-<p:sld xmlns:a="http://schemas.openxmlformats.org/drawingml/2006/main" xmlns:p="http://schemas.openxmlformats.org/presentationml/2006/main" xmlns:r="http://schemas.openxmlformats.org/officeDocument/2006/relationships">
-  <p:cSld>
-    <p:spTree>
-      <p:nvGrpSpPr>
-        <p:cNvPr id="1" name=""/>
-        <p:cNvGrpSpPr/>
-        <p:nvPr/>
-      </p:nvGrpSpPr>
-      <p:grpSpPr/>
-      <p:sp>
-        <p:nvSpPr>
-          <p:cNvPr id="2" name="TextBox 1"/>
-          <p:cNvSpPr txBox="1"/>
-          <p:nvPr/>
-        </p:nvSpPr>
-        <p:spPr>
-          <a:xfrm>
-            <a:off x="914400" y="914400"/>
-            <a:ext cx="914400" cy="914400"/>
-          </a:xfrm>
-          <a:prstGeom prst="rect">
-            <a:avLst/>
-          </a:prstGeom>
-          <a:noFill/>
-        </p:spPr>
-        <p:txBody>
-          <a:bodyPr wrap="none">
-            <a:spAutoFit/>
-          </a:bodyPr>
-          <a:lstStyle/>
-          <a:p>
-            <a:r>
-              <a:t>Info:</a:t>
-            </a:r>
-          </a:p>
-          <a:p>
-            <a:pPr>
-              <a:defRPr sz="1200"/>
-            </a:pPr>
-            <a:r>
-              <a:t>Yes! Python allows you to write over assigned variable names. We can also use the variables themselves when doing the reassignment. Here is an example of what I mean:</a:t>
-            </a:r>
-            <a:br/>
-          </a:p>
-        </p:txBody>
-      </p:sp>
-    </p:spTree>
-  </p:cSld>
-  <p:clrMapOvr>
-    <a:masterClrMapping/>
-  </p:clrMapOvr>
-</p:sld>
-</file>
-
-<file path=ppt/slides/slide33.xml><?xml version="1.0" encoding="utf-8"?>
-<p:sld xmlns:a="http://schemas.openxmlformats.org/drawingml/2006/main" xmlns:p="http://schemas.openxmlformats.org/presentationml/2006/main" xmlns:r="http://schemas.openxmlformats.org/officeDocument/2006/relationships">
-  <p:cSld>
-    <p:spTree>
-      <p:nvGrpSpPr>
-        <p:cNvPr id="1" name=""/>
-        <p:cNvGrpSpPr/>
-        <p:nvPr/>
-      </p:nvGrpSpPr>
-      <p:grpSpPr/>
-      <p:sp>
-        <p:nvSpPr>
-          <p:cNvPr id="2" name="TextBox 1"/>
-          <p:cNvSpPr txBox="1"/>
-          <p:nvPr/>
-        </p:nvSpPr>
-        <p:spPr>
-          <a:xfrm>
-            <a:off x="914400" y="914400"/>
-            <a:ext cx="914400" cy="914400"/>
-          </a:xfrm>
-          <a:prstGeom prst="rect">
-            <a:avLst/>
-          </a:prstGeom>
-          <a:noFill/>
-        </p:spPr>
-        <p:txBody>
-          <a:bodyPr wrap="none">
-            <a:spAutoFit/>
-          </a:bodyPr>
-          <a:lstStyle/>
-          <a:p>
-            <a:r>
-              <a:t>Python Code: </a:t>
-            </a:r>
-          </a:p>
-          <a:p>
-            <a:pPr>
-              <a:defRPr sz="1200"/>
-            </a:pPr>
-            <a:r>
-              <a:t>``` # Check</a:t>
-            </a:r>
-            <a:br/>
-            <a:r>
-              <a:t> `````` a ```</a:t>
-            </a:r>
-            <a:br/>
-          </a:p>
-        </p:txBody>
-      </p:sp>
-    </p:spTree>
-  </p:cSld>
-  <p:clrMapOvr>
-    <a:masterClrMapping/>
-  </p:clrMapOvr>
-</p:sld>
-</file>
-
-<file path=ppt/slides/slide34.xml><?xml version="1.0" encoding="utf-8"?>
-<p:sld xmlns:a="http://schemas.openxmlformats.org/drawingml/2006/main" xmlns:p="http://schemas.openxmlformats.org/presentationml/2006/main" xmlns:r="http://schemas.openxmlformats.org/officeDocument/2006/relationships">
-  <p:cSld>
-    <p:spTree>
-      <p:nvGrpSpPr>
-        <p:cNvPr id="1" name=""/>
-        <p:cNvGrpSpPr/>
-        <p:nvPr/>
-      </p:nvGrpSpPr>
-      <p:grpSpPr/>
-      <p:sp>
-        <p:nvSpPr>
-          <p:cNvPr id="2" name="TextBox 1"/>
-          <p:cNvSpPr txBox="1"/>
-          <p:nvPr/>
-        </p:nvSpPr>
-        <p:spPr>
-          <a:xfrm>
-            <a:off x="914400" y="914400"/>
-            <a:ext cx="914400" cy="914400"/>
-          </a:xfrm>
-          <a:prstGeom prst="rect">
-            <a:avLst/>
-          </a:prstGeom>
-          <a:noFill/>
-        </p:spPr>
-        <p:txBody>
-          <a:bodyPr wrap="none">
-            <a:spAutoFit/>
-          </a:bodyPr>
-          <a:lstStyle/>
-          <a:p>
-            <a:r>
-              <a:t>Python Code: </a:t>
-            </a:r>
-          </a:p>
-          <a:p>
-            <a:pPr>
-              <a:defRPr sz="1200"/>
-            </a:pPr>
-            <a:r>
-              <a:t>``` # Use A to redefine A</a:t>
-            </a:r>
-            <a:br/>
-            <a:r>
-              <a:t> `````` a = a + a ```</a:t>
-            </a:r>
-            <a:br/>
-          </a:p>
-        </p:txBody>
-      </p:sp>
-    </p:spTree>
-  </p:cSld>
-  <p:clrMapOvr>
-    <a:masterClrMapping/>
-  </p:clrMapOvr>
-</p:sld>
-</file>
-
-<file path=ppt/slides/slide35.xml><?xml version="1.0" encoding="utf-8"?>
-<p:sld xmlns:a="http://schemas.openxmlformats.org/drawingml/2006/main" xmlns:p="http://schemas.openxmlformats.org/presentationml/2006/main" xmlns:r="http://schemas.openxmlformats.org/officeDocument/2006/relationships">
-  <p:cSld>
-    <p:spTree>
-      <p:nvGrpSpPr>
-        <p:cNvPr id="1" name=""/>
-        <p:cNvGrpSpPr/>
-        <p:nvPr/>
-      </p:nvGrpSpPr>
-      <p:grpSpPr/>
-      <p:sp>
-        <p:nvSpPr>
-          <p:cNvPr id="2" name="TextBox 1"/>
-          <p:cNvSpPr txBox="1"/>
-          <p:nvPr/>
-        </p:nvSpPr>
-        <p:spPr>
-          <a:xfrm>
-            <a:off x="914400" y="914400"/>
-            <a:ext cx="914400" cy="914400"/>
-          </a:xfrm>
-          <a:prstGeom prst="rect">
-            <a:avLst/>
-          </a:prstGeom>
-          <a:noFill/>
-        </p:spPr>
-        <p:txBody>
-          <a:bodyPr wrap="none">
-            <a:spAutoFit/>
-          </a:bodyPr>
-          <a:lstStyle/>
-          <a:p>
-            <a:r>
-              <a:t>Python Code: </a:t>
-            </a:r>
-          </a:p>
-          <a:p>
-            <a:pPr>
-              <a:defRPr sz="1200"/>
-            </a:pPr>
-            <a:r>
-              <a:t>``` # Check </a:t>
-            </a:r>
-            <a:br/>
-            <a:r>
-              <a:t> `````` a ```</a:t>
-            </a:r>
-            <a:br/>
-          </a:p>
-        </p:txBody>
-      </p:sp>
-    </p:spTree>
-  </p:cSld>
-  <p:clrMapOvr>
-    <a:masterClrMapping/>
-  </p:clrMapOvr>
-</p:sld>
-</file>
-
-<file path=ppt/slides/slide36.xml><?xml version="1.0" encoding="utf-8"?>
-<p:sld xmlns:a="http://schemas.openxmlformats.org/drawingml/2006/main" xmlns:p="http://schemas.openxmlformats.org/presentationml/2006/main" xmlns:r="http://schemas.openxmlformats.org/officeDocument/2006/relationships">
-  <p:cSld>
-    <p:spTree>
-      <p:nvGrpSpPr>
-        <p:cNvPr id="1" name=""/>
-        <p:cNvGrpSpPr/>
-        <p:nvPr/>
-      </p:nvGrpSpPr>
-      <p:grpSpPr/>
-      <p:sp>
-        <p:nvSpPr>
-          <p:cNvPr id="2" name="TextBox 1"/>
-          <p:cNvSpPr txBox="1"/>
-          <p:nvPr/>
-        </p:nvSpPr>
-        <p:spPr>
-          <a:xfrm>
-            <a:off x="914400" y="914400"/>
-            <a:ext cx="914400" cy="914400"/>
-          </a:xfrm>
-          <a:prstGeom prst="rect">
-            <a:avLst/>
-          </a:prstGeom>
-          <a:noFill/>
-        </p:spPr>
-        <p:txBody>
-          <a:bodyPr wrap="none">
-            <a:spAutoFit/>
-          </a:bodyPr>
-          <a:lstStyle/>
-          <a:p>
-            <a:r>
-              <a:t>Info:</a:t>
-            </a:r>
-          </a:p>
-          <a:p>
-            <a:pPr>
-              <a:defRPr sz="1200"/>
-            </a:pPr>
-            <a:r>
-              <a:t>The names you use when creating these labels need to follow a few rules:</a:t>
-            </a:r>
-            <a:br/>
-            <a:br/>
-            <a:r>
-              <a:t>    1. Names can not start with a number.</a:t>
-            </a:r>
-            <a:br/>
-            <a:r>
-              <a:t>    2. There can be no spaces in the name, use _ instead.</a:t>
-            </a:r>
-            <a:br/>
-            <a:r>
-              <a:t>    3. Can't use any of these symbols :'",&lt;&gt;/?|\()!@#$%^&amp;*~-+</a:t>
-            </a:r>
-            <a:br/>
-            <a:r>
-              <a:t>    4. It's considered best practice (PEP8) that names are lowercase.</a:t>
-            </a:r>
-            <a:br/>
-            <a:r>
-              <a:t>    5. Avoid using the characters 'l' (lowercase letter el), 'O' (uppercase letter oh), </a:t>
-            </a:r>
-            <a:br/>
-            <a:r>
-              <a:t>       or 'I' (uppercase letter eye) as single character variable names.</a:t>
-            </a:r>
-            <a:br/>
-            <a:r>
-              <a:t>    6. Avoid using words that have special meaning in Python like "list" and "str"</a:t>
-            </a:r>
-            <a:br/>
-            <a:br/>
-            <a:br/>
-            <a:r>
-              <a:t>Using variable names can be a very useful way to keep track of different variables in Python. For example:</a:t>
-            </a:r>
-            <a:br/>
-          </a:p>
-        </p:txBody>
-      </p:sp>
-    </p:spTree>
-  </p:cSld>
-  <p:clrMapOvr>
-    <a:masterClrMapping/>
-  </p:clrMapOvr>
-</p:sld>
-</file>
-
-<file path=ppt/slides/slide37.xml><?xml version="1.0" encoding="utf-8"?>
-<p:sld xmlns:a="http://schemas.openxmlformats.org/drawingml/2006/main" xmlns:p="http://schemas.openxmlformats.org/presentationml/2006/main" xmlns:r="http://schemas.openxmlformats.org/officeDocument/2006/relationships">
-  <p:cSld>
-    <p:spTree>
-      <p:nvGrpSpPr>
-        <p:cNvPr id="1" name=""/>
-        <p:cNvGrpSpPr/>
-        <p:nvPr/>
-      </p:nvGrpSpPr>
-      <p:grpSpPr/>
-      <p:sp>
-        <p:nvSpPr>
-          <p:cNvPr id="2" name="TextBox 1"/>
-          <p:cNvSpPr txBox="1"/>
-          <p:nvPr/>
-        </p:nvSpPr>
-        <p:spPr>
-          <a:xfrm>
-            <a:off x="914400" y="914400"/>
-            <a:ext cx="914400" cy="914400"/>
-          </a:xfrm>
-          <a:prstGeom prst="rect">
-            <a:avLst/>
-          </a:prstGeom>
-          <a:noFill/>
-        </p:spPr>
-        <p:txBody>
-          <a:bodyPr wrap="none">
-            <a:spAutoFit/>
-          </a:bodyPr>
-          <a:lstStyle/>
-          <a:p>
-            <a:r>
-              <a:t>Python Code: </a:t>
-            </a:r>
-          </a:p>
-          <a:p>
-            <a:pPr>
-              <a:defRPr sz="1200"/>
-            </a:pPr>
-            <a:r>
-              <a:t>``` # Use object names to keep better track of what's going on in your code!</a:t>
-            </a:r>
-            <a:br/>
-            <a:r>
-              <a:t> `````` my_income = 100</a:t>
-            </a:r>
-            <a:br/>
-            <a:r>
-              <a:t> `````` </a:t>
-            </a:r>
-            <a:br/>
-            <a:r>
-              <a:t> `````` tax_rate = 0.1</a:t>
-            </a:r>
-            <a:br/>
-            <a:r>
-              <a:t> `````` </a:t>
-            </a:r>
-            <a:br/>
-            <a:r>
-              <a:t> `````` my_taxes = my_income*tax_rate ```</a:t>
-            </a:r>
-            <a:br/>
-          </a:p>
-        </p:txBody>
-      </p:sp>
-    </p:spTree>
-  </p:cSld>
-  <p:clrMapOvr>
-    <a:masterClrMapping/>
-  </p:clrMapOvr>
-</p:sld>
-</file>
-
-<file path=ppt/slides/slide38.xml><?xml version="1.0" encoding="utf-8"?>
-<p:sld xmlns:a="http://schemas.openxmlformats.org/drawingml/2006/main" xmlns:p="http://schemas.openxmlformats.org/presentationml/2006/main" xmlns:r="http://schemas.openxmlformats.org/officeDocument/2006/relationships">
-  <p:cSld>
-    <p:spTree>
-      <p:nvGrpSpPr>
-        <p:cNvPr id="1" name=""/>
-        <p:cNvGrpSpPr/>
-        <p:nvPr/>
-      </p:nvGrpSpPr>
-      <p:grpSpPr/>
-      <p:sp>
-        <p:nvSpPr>
-          <p:cNvPr id="2" name="TextBox 1"/>
-          <p:cNvSpPr txBox="1"/>
-          <p:nvPr/>
-        </p:nvSpPr>
-        <p:spPr>
-          <a:xfrm>
-            <a:off x="914400" y="914400"/>
-            <a:ext cx="914400" cy="914400"/>
-          </a:xfrm>
-          <a:prstGeom prst="rect">
-            <a:avLst/>
-          </a:prstGeom>
-          <a:noFill/>
-        </p:spPr>
-        <p:txBody>
-          <a:bodyPr wrap="none">
-            <a:spAutoFit/>
-          </a:bodyPr>
-          <a:lstStyle/>
-          <a:p>
-            <a:r>
-              <a:t>Python Code: </a:t>
-            </a:r>
-          </a:p>
-          <a:p>
-            <a:pPr>
-              <a:defRPr sz="1200"/>
-            </a:pPr>
-            <a:r>
-              <a:t>``` # Show my taxes!</a:t>
-            </a:r>
-            <a:br/>
-            <a:r>
-              <a:t> `````` my_taxes ```</a:t>
-            </a:r>
-            <a:br/>
-          </a:p>
-        </p:txBody>
-      </p:sp>
-    </p:spTree>
-  </p:cSld>
-  <p:clrMapOvr>
-    <a:masterClrMapping/>
-  </p:clrMapOvr>
-</p:sld>
-</file>
-
-<file path=ppt/slides/slide39.xml><?xml version="1.0" encoding="utf-8"?>
-<p:sld xmlns:a="http://schemas.openxmlformats.org/drawingml/2006/main" xmlns:p="http://schemas.openxmlformats.org/presentationml/2006/main" xmlns:r="http://schemas.openxmlformats.org/officeDocument/2006/relationships">
-  <p:cSld>
-    <p:spTree>
-      <p:nvGrpSpPr>
-        <p:cNvPr id="1" name=""/>
-        <p:cNvGrpSpPr/>
-        <p:nvPr/>
-      </p:nvGrpSpPr>
-      <p:grpSpPr/>
-      <p:sp>
-        <p:nvSpPr>
-          <p:cNvPr id="2" name="TextBox 1"/>
-          <p:cNvSpPr txBox="1"/>
-          <p:nvPr/>
-        </p:nvSpPr>
-        <p:spPr>
-          <a:xfrm>
-            <a:off x="914400" y="914400"/>
-            <a:ext cx="914400" cy="914400"/>
-          </a:xfrm>
-          <a:prstGeom prst="rect">
-            <a:avLst/>
-          </a:prstGeom>
-          <a:noFill/>
-        </p:spPr>
-        <p:txBody>
-          <a:bodyPr wrap="none">
-            <a:spAutoFit/>
-          </a:bodyPr>
-          <a:lstStyle/>
-          <a:p>
-            <a:r>
-              <a:t>Info:</a:t>
-            </a:r>
-          </a:p>
-          <a:p>
-            <a:pPr>
-              <a:defRPr sz="1200"/>
-            </a:pPr>
-            <a:r>
-              <a:t>So what have we learned? We learned some of the basics of numbers in Python. We also learned how to do arithmetic and use Python as a basic calculator. We then wrapped it up with learning about Variable Assignment in Python.</a:t>
-            </a:r>
-            <a:br/>
-            <a:br/>
-            <a:r>
-              <a:t>Up next we'll learn about Strings!</a:t>
-            </a:r>
-            <a:br/>
-          </a:p>
-        </p:txBody>
-      </p:sp>
-    </p:spTree>
-  </p:cSld>
-  <p:clrMapOvr>
-    <a:masterClrMapping/>
-  </p:clrMapOvr>
-</p:sld>
-</file>
-
-<file path=ppt/slides/slide4.xml><?xml version="1.0" encoding="utf-8"?>
-<p:sld xmlns:a="http://schemas.openxmlformats.org/drawingml/2006/main" xmlns:p="http://schemas.openxmlformats.org/presentationml/2006/main" xmlns:r="http://schemas.openxmlformats.org/officeDocument/2006/relationships">
-  <p:cSld>
-    <p:spTree>
-      <p:nvGrpSpPr>
-        <p:cNvPr id="1" name=""/>
-        <p:cNvGrpSpPr/>
-        <p:nvPr/>
-      </p:nvGrpSpPr>
-      <p:grpSpPr/>
-      <p:sp>
-        <p:nvSpPr>
-          <p:cNvPr id="2" name="TextBox 1"/>
-          <p:cNvSpPr txBox="1"/>
-          <p:nvPr/>
-        </p:nvSpPr>
-        <p:spPr>
-          <a:xfrm>
-            <a:off x="914400" y="914400"/>
-            <a:ext cx="914400" cy="914400"/>
-          </a:xfrm>
-          <a:prstGeom prst="rect">
-            <a:avLst/>
-          </a:prstGeom>
-          <a:noFill/>
-        </p:spPr>
-        <p:txBody>
-          <a:bodyPr wrap="none">
-            <a:spAutoFit/>
-          </a:bodyPr>
-          <a:lstStyle/>
-          <a:p>
-            <a:r>
-              <a:t>Info:</a:t>
-            </a:r>
-          </a:p>
-          <a:p>
-            <a:pPr>
-              <a:defRPr sz="1200"/>
-            </a:pPr>
-            <a:r>
-              <a:t>&lt;center&gt;</a:t>
-            </a:r>
-            <a:br/>
-            <a:r>
-              <a:t>    &lt;img src='https://intecbrussel.be/img/logo3.png' width='400px' height='auto'/&gt;</a:t>
-            </a:r>
-            <a:br/>
-            <a:r>
-              <a:t>    &lt;br/&gt;</a:t>
-            </a:r>
-            <a:br/>
-            <a:r>
-              <a:t>    &lt;em&gt;Python course materials&lt;/em&gt;</a:t>
-            </a:r>
-            <a:br/>
-            <a:r>
-              <a:t>&lt;/center&gt;</a:t>
-            </a:r>
-            <a:br/>
-          </a:p>
-        </p:txBody>
-      </p:sp>
-    </p:spTree>
-  </p:cSld>
-  <p:clrMapOvr>
-    <a:masterClrMapping/>
-  </p:clrMapOvr>
-</p:sld>
-</file>
-
-<file path=ppt/slides/slide5.xml><?xml version="1.0" encoding="utf-8"?>
-<p:sld xmlns:a="http://schemas.openxmlformats.org/drawingml/2006/main" xmlns:p="http://schemas.openxmlformats.org/presentationml/2006/main" xmlns:r="http://schemas.openxmlformats.org/officeDocument/2006/relationships">
-  <p:cSld>
-    <p:spTree>
-      <p:nvGrpSpPr>
-        <p:cNvPr id="1" name=""/>
-        <p:cNvGrpSpPr/>
-        <p:nvPr/>
-      </p:nvGrpSpPr>
-      <p:grpSpPr/>
-      <p:sp>
-        <p:nvSpPr>
-          <p:cNvPr id="2" name="TextBox 1"/>
-          <p:cNvSpPr txBox="1"/>
-          <p:nvPr/>
-        </p:nvSpPr>
-        <p:spPr>
-          <a:xfrm>
-            <a:off x="914400" y="914400"/>
-            <a:ext cx="914400" cy="914400"/>
-          </a:xfrm>
-          <a:prstGeom prst="rect">
-            <a:avLst/>
-          </a:prstGeom>
-          <a:noFill/>
-        </p:spPr>
-        <p:txBody>
-          <a:bodyPr wrap="none">
-            <a:spAutoFit/>
-          </a:bodyPr>
-          <a:lstStyle/>
-          <a:p>
-            <a:r>
-              <a:t>Info:</a:t>
-            </a:r>
-          </a:p>
-          <a:p>
-            <a:pPr>
-              <a:defRPr sz="1200"/>
-            </a:pPr>
-            <a:r>
-              <a:t># Numbers and more in Python!</a:t>
-            </a:r>
-            <a:br/>
-            <a:br/>
-            <a:r>
-              <a:t>In this lecture, we will learn about numbers in Python and how to use them.</a:t>
-            </a:r>
-            <a:br/>
-            <a:br/>
-            <a:r>
-              <a:t>We'll learn about the following topics:</a:t>
-            </a:r>
-            <a:br/>
-            <a:br/>
-            <a:r>
-              <a:t>    1.) Types of Numbers in Python</a:t>
-            </a:r>
-            <a:br/>
-            <a:r>
-              <a:t>    2.) Basic Arithmetic</a:t>
-            </a:r>
-            <a:br/>
-            <a:r>
-              <a:t>    3.) Differences between classic division and floor division</a:t>
-            </a:r>
-            <a:br/>
-            <a:r>
-              <a:t>    4.) Object Assignment in Python</a:t>
-            </a:r>
-            <a:br/>
-          </a:p>
-        </p:txBody>
-      </p:sp>
-    </p:spTree>
-  </p:cSld>
-  <p:clrMapOvr>
-    <a:masterClrMapping/>
-  </p:clrMapOvr>
-</p:sld>
-</file>
-
-<file path=ppt/slides/slide6.xml><?xml version="1.0" encoding="utf-8"?>
-<p:sld xmlns:a="http://schemas.openxmlformats.org/drawingml/2006/main" xmlns:p="http://schemas.openxmlformats.org/presentationml/2006/main" xmlns:r="http://schemas.openxmlformats.org/officeDocument/2006/relationships">
-  <p:cSld>
-    <p:spTree>
-      <p:nvGrpSpPr>
-        <p:cNvPr id="1" name=""/>
-        <p:cNvGrpSpPr/>
-        <p:nvPr/>
-      </p:nvGrpSpPr>
-      <p:grpSpPr/>
-      <p:sp>
-        <p:nvSpPr>
-          <p:cNvPr id="2" name="TextBox 1"/>
-          <p:cNvSpPr txBox="1"/>
-          <p:nvPr/>
-        </p:nvSpPr>
-        <p:spPr>
-          <a:xfrm>
-            <a:off x="914400" y="914400"/>
-            <a:ext cx="914400" cy="914400"/>
-          </a:xfrm>
-          <a:prstGeom prst="rect">
-            <a:avLst/>
-          </a:prstGeom>
-          <a:noFill/>
-        </p:spPr>
-        <p:txBody>
-          <a:bodyPr wrap="none">
-            <a:spAutoFit/>
-          </a:bodyPr>
-          <a:lstStyle/>
-          <a:p>
-            <a:r>
-              <a:t>Info:</a:t>
-            </a:r>
-          </a:p>
-          <a:p>
-            <a:pPr>
-              <a:defRPr sz="1200"/>
-            </a:pPr>
-            <a:r>
-              <a:t>## Types of numbers</a:t>
-            </a:r>
-            <a:br/>
-            <a:br/>
-            <a:r>
-              <a:t>Python has various "types" of numbers (numeric literals). We'll mainly focus on integers and floating point numbers.</a:t>
-            </a:r>
-            <a:br/>
-            <a:br/>
-            <a:r>
-              <a:t>Integers are just whole numbers, positive or negative. For example: 2 and -2 are examples of integers.</a:t>
-            </a:r>
-            <a:br/>
-            <a:br/>
-            <a:r>
-              <a:t>Floating point numbers in Python are notable because they have a decimal point in them, or use an exponential (e) to define the number. For example 2.0 and -2.1 are examples of floating point numbers. 4E2 (4 times 10 to the power of 2) is also an example of a floating point number in Python.</a:t>
-            </a:r>
-            <a:br/>
-            <a:br/>
-            <a:r>
-              <a:t>Throughout this course we will be mainly working with integers or simple float number types.</a:t>
-            </a:r>
-            <a:br/>
-            <a:br/>
-            <a:r>
-              <a:t>Here is a table of the two main types we will spend most of our time working with some examples:</a:t>
-            </a:r>
-            <a:br/>
-          </a:p>
-        </p:txBody>
-      </p:sp>
-    </p:spTree>
-  </p:cSld>
-  <p:clrMapOvr>
-    <a:masterClrMapping/>
-  </p:clrMapOvr>
-</p:sld>
-</file>
-
-<file path=ppt/slides/slide7.xml><?xml version="1.0" encoding="utf-8"?>
-<p:sld xmlns:a="http://schemas.openxmlformats.org/drawingml/2006/main" xmlns:p="http://schemas.openxmlformats.org/presentationml/2006/main" xmlns:r="http://schemas.openxmlformats.org/officeDocument/2006/relationships">
-  <p:cSld>
-    <p:spTree>
-      <p:nvGrpSpPr>
-        <p:cNvPr id="1" name=""/>
-        <p:cNvGrpSpPr/>
-        <p:nvPr/>
-      </p:nvGrpSpPr>
-      <p:grpSpPr/>
-      <p:sp>
-        <p:nvSpPr>
-          <p:cNvPr id="2" name="TextBox 1"/>
-          <p:cNvSpPr txBox="1"/>
-          <p:nvPr/>
-        </p:nvSpPr>
-        <p:spPr>
-          <a:xfrm>
-            <a:off x="914400" y="914400"/>
-            <a:ext cx="914400" cy="914400"/>
-          </a:xfrm>
-          <a:prstGeom prst="rect">
-            <a:avLst/>
-          </a:prstGeom>
-          <a:noFill/>
-        </p:spPr>
-        <p:txBody>
-          <a:bodyPr wrap="none">
-            <a:spAutoFit/>
-          </a:bodyPr>
-          <a:lstStyle/>
-          <a:p>
-            <a:r>
-              <a:t>Info:</a:t>
-            </a:r>
-          </a:p>
-          <a:p>
-            <a:pPr>
-              <a:defRPr sz="1200"/>
-            </a:pPr>
-            <a:r>
-              <a:t>&lt;table&gt;</a:t>
-            </a:r>
-            <a:br/>
-            <a:r>
-              <a:t>&lt;tr&gt;</a:t>
-            </a:r>
-            <a:br/>
-            <a:r>
-              <a:t>    &lt;th&gt;Examples&lt;/th&gt; </a:t>
-            </a:r>
-            <a:br/>
-            <a:r>
-              <a:t>    &lt;th&gt;Number "Type"&lt;/th&gt;</a:t>
-            </a:r>
-            <a:br/>
-            <a:r>
-              <a:t>&lt;/tr&gt;</a:t>
-            </a:r>
-            <a:br/>
-            <a:br/>
-            <a:r>
-              <a:t>&lt;tr&gt;</a:t>
-            </a:r>
-            <a:br/>
-            <a:r>
-              <a:t>    &lt;td&gt;1,2,-5,1000&lt;/td&gt;</a:t>
-            </a:r>
-            <a:br/>
-            <a:r>
-              <a:t>    &lt;td&gt;Integers&lt;/td&gt; </a:t>
-            </a:r>
-            <a:br/>
-            <a:r>
-              <a:t>&lt;/tr&gt;</a:t>
-            </a:r>
-            <a:br/>
-            <a:br/>
-            <a:r>
-              <a:t>&lt;tr&gt;</a:t>
-            </a:r>
-            <a:br/>
-            <a:r>
-              <a:t>    &lt;td&gt;1.2,-0.5,2e2,3E2&lt;/td&gt; </a:t>
-            </a:r>
-            <a:br/>
-            <a:r>
-              <a:t>    &lt;td&gt;Floating-point numbers&lt;/td&gt; </a:t>
-            </a:r>
-            <a:br/>
-            <a:r>
-              <a:t>&lt;/tr&gt;</a:t>
-            </a:r>
-            <a:br/>
-            <a:r>
-              <a:t> &lt;/table&gt;</a:t>
-            </a:r>
-            <a:br/>
-          </a:p>
-        </p:txBody>
-      </p:sp>
-    </p:spTree>
-  </p:cSld>
-  <p:clrMapOvr>
-    <a:masterClrMapping/>
-  </p:clrMapOvr>
-</p:sld>
-</file>
-
-<file path=ppt/slides/slide8.xml><?xml version="1.0" encoding="utf-8"?>
-<p:sld xmlns:a="http://schemas.openxmlformats.org/drawingml/2006/main" xmlns:p="http://schemas.openxmlformats.org/presentationml/2006/main" xmlns:r="http://schemas.openxmlformats.org/officeDocument/2006/relationships">
-  <p:cSld>
-    <p:spTree>
-      <p:nvGrpSpPr>
-        <p:cNvPr id="1" name=""/>
-        <p:cNvGrpSpPr/>
-        <p:nvPr/>
-      </p:nvGrpSpPr>
-      <p:grpSpPr/>
-      <p:sp>
-        <p:nvSpPr>
-          <p:cNvPr id="2" name="TextBox 1"/>
-          <p:cNvSpPr txBox="1"/>
-          <p:nvPr/>
-        </p:nvSpPr>
-        <p:spPr>
-          <a:xfrm>
-            <a:off x="914400" y="914400"/>
-            <a:ext cx="914400" cy="914400"/>
-          </a:xfrm>
-          <a:prstGeom prst="rect">
-            <a:avLst/>
-          </a:prstGeom>
-          <a:noFill/>
-        </p:spPr>
-        <p:txBody>
-          <a:bodyPr wrap="none">
-            <a:spAutoFit/>
-          </a:bodyPr>
-          <a:lstStyle/>
-          <a:p>
-            <a:r>
-              <a:t>Info:</a:t>
-            </a:r>
-          </a:p>
-          <a:p>
-            <a:pPr>
-              <a:defRPr sz="1200"/>
-            </a:pPr>
-            <a:r>
-              <a:t> </a:t>
-            </a:r>
-            <a:br/>
-            <a:r>
-              <a:t> </a:t>
-            </a:r>
-            <a:br/>
-            <a:r>
-              <a:t>Now let's start with some basic arithmetic.</a:t>
-            </a:r>
-            <a:br/>
-          </a:p>
-        </p:txBody>
-      </p:sp>
-    </p:spTree>
-  </p:cSld>
-  <p:clrMapOvr>
-    <a:masterClrMapping/>
-  </p:clrMapOvr>
-</p:sld>
-</file>
-
-<file path=ppt/slides/slide9.xml><?xml version="1.0" encoding="utf-8"?>
-<p:sld xmlns:a="http://schemas.openxmlformats.org/drawingml/2006/main" xmlns:p="http://schemas.openxmlformats.org/presentationml/2006/main" xmlns:r="http://schemas.openxmlformats.org/officeDocument/2006/relationships">
-  <p:cSld>
-    <p:spTree>
-      <p:nvGrpSpPr>
-        <p:cNvPr id="1" name=""/>
-        <p:cNvGrpSpPr/>
-        <p:nvPr/>
-      </p:nvGrpSpPr>
-      <p:grpSpPr/>
-      <p:sp>
-        <p:nvSpPr>
-          <p:cNvPr id="2" name="TextBox 1"/>
-          <p:cNvSpPr txBox="1"/>
-          <p:nvPr/>
-        </p:nvSpPr>
-        <p:spPr>
-          <a:xfrm>
-            <a:off x="914400" y="914400"/>
-            <a:ext cx="914400" cy="914400"/>
-          </a:xfrm>
-          <a:prstGeom prst="rect">
-            <a:avLst/>
-          </a:prstGeom>
-          <a:noFill/>
-        </p:spPr>
-        <p:txBody>
-          <a:bodyPr wrap="none">
-            <a:spAutoFit/>
-          </a:bodyPr>
-          <a:lstStyle/>
-          <a:p>
-            <a:r>
-              <a:t>Info:</a:t>
-            </a:r>
-          </a:p>
-          <a:p>
-            <a:pPr>
-              <a:defRPr sz="1200"/>
-            </a:pPr>
-            <a:r>
-              <a:t>### Basic Arithmetic</a:t>
-            </a:r>
-            <a:br/>
-          </a:p>
-        </p:txBody>
-      </p:sp>
-    </p:spTree>
-  </p:cSld>
-  <p:clrMapOvr>
-    <a:masterClrMapping/>
-  </p:clrMapOvr>
 </p:sld>
 </file>
 
@@ -7434,4 +5094,265 @@
   </a:objectDefaults>
   <a:extraClrSchemeLst/>
 </a:theme>
+</file>
+
+<file path=ppt/theme/theme2.xml><?xml version="1.0" encoding="utf-8"?>
+<a:theme xmlns:a="http://schemas.openxmlformats.org/drawingml/2006/main" name="Office Theme">
+  <a:themeElements>
+    <a:clrScheme name="Office">
+      <a:dk1>
+        <a:sysClr val="windowText" lastClr="000000"/>
+      </a:dk1>
+      <a:lt1>
+        <a:sysClr val="window" lastClr="FFFFFF"/>
+      </a:lt1>
+      <a:dk2>
+        <a:srgbClr val="44546A"/>
+      </a:dk2>
+      <a:lt2>
+        <a:srgbClr val="E7E6E6"/>
+      </a:lt2>
+      <a:accent1>
+        <a:srgbClr val="5B9BD5"/>
+      </a:accent1>
+      <a:accent2>
+        <a:srgbClr val="ED7D31"/>
+      </a:accent2>
+      <a:accent3>
+        <a:srgbClr val="A5A5A5"/>
+      </a:accent3>
+      <a:accent4>
+        <a:srgbClr val="FFC000"/>
+      </a:accent4>
+      <a:accent5>
+        <a:srgbClr val="4472C4"/>
+      </a:accent5>
+      <a:accent6>
+        <a:srgbClr val="70AD47"/>
+      </a:accent6>
+      <a:hlink>
+        <a:srgbClr val="0563C1"/>
+      </a:hlink>
+      <a:folHlink>
+        <a:srgbClr val="954F72"/>
+      </a:folHlink>
+    </a:clrScheme>
+    <a:fontScheme name="Office">
+      <a:majorFont>
+        <a:latin typeface="Calibri Light" panose="020F0302020204030204"/>
+        <a:ea typeface=""/>
+        <a:cs typeface=""/>
+        <a:font script="Jpan" typeface="ＭＳ Ｐゴシック"/>
+        <a:font script="Hang" typeface="맑은 고딕"/>
+        <a:font script="Hans" typeface="宋体"/>
+        <a:font script="Hant" typeface="新細明體"/>
+        <a:font script="Arab" typeface="Times New Roman"/>
+        <a:font script="Hebr" typeface="Times New Roman"/>
+        <a:font script="Thai" typeface="Angsana New"/>
+        <a:font script="Ethi" typeface="Nyala"/>
+        <a:font script="Beng" typeface="Vrinda"/>
+        <a:font script="Gujr" typeface="Shruti"/>
+        <a:font script="Khmr" typeface="MoolBoran"/>
+        <a:font script="Knda" typeface="Tunga"/>
+        <a:font script="Guru" typeface="Raavi"/>
+        <a:font script="Cans" typeface="Euphemia"/>
+        <a:font script="Cher" typeface="Plantagenet Cherokee"/>
+        <a:font script="Yiii" typeface="Microsoft Yi Baiti"/>
+        <a:font script="Tibt" typeface="Microsoft Himalaya"/>
+        <a:font script="Thaa" typeface="MV Boli"/>
+        <a:font script="Deva" typeface="Mangal"/>
+        <a:font script="Telu" typeface="Gautami"/>
+        <a:font script="Taml" typeface="Latha"/>
+        <a:font script="Syrc" typeface="Estrangelo Edessa"/>
+        <a:font script="Orya" typeface="Kalinga"/>
+        <a:font script="Mlym" typeface="Kartika"/>
+        <a:font script="Laoo" typeface="DokChampa"/>
+        <a:font script="Sinh" typeface="Iskoola Pota"/>
+        <a:font script="Mong" typeface="Mongolian Baiti"/>
+        <a:font script="Viet" typeface="Times New Roman"/>
+        <a:font script="Uigh" typeface="Microsoft Uighur"/>
+        <a:font script="Geor" typeface="Sylfaen"/>
+      </a:majorFont>
+      <a:minorFont>
+        <a:latin typeface="Calibri" panose="020F0502020204030204"/>
+        <a:ea typeface=""/>
+        <a:cs typeface=""/>
+        <a:font script="Jpan" typeface="ＭＳ Ｐゴシック"/>
+        <a:font script="Hang" typeface="맑은 고딕"/>
+        <a:font script="Hans" typeface="宋体"/>
+        <a:font script="Hant" typeface="新細明體"/>
+        <a:font script="Arab" typeface="Arial"/>
+        <a:font script="Hebr" typeface="Arial"/>
+        <a:font script="Thai" typeface="Cordia New"/>
+        <a:font script="Ethi" typeface="Nyala"/>
+        <a:font script="Beng" typeface="Vrinda"/>
+        <a:font script="Gujr" typeface="Shruti"/>
+        <a:font script="Khmr" typeface="DaunPenh"/>
+        <a:font script="Knda" typeface="Tunga"/>
+        <a:font script="Guru" typeface="Raavi"/>
+        <a:font script="Cans" typeface="Euphemia"/>
+        <a:font script="Cher" typeface="Plantagenet Cherokee"/>
+        <a:font script="Yiii" typeface="Microsoft Yi Baiti"/>
+        <a:font script="Tibt" typeface="Microsoft Himalaya"/>
+        <a:font script="Thaa" typeface="MV Boli"/>
+        <a:font script="Deva" typeface="Mangal"/>
+        <a:font script="Telu" typeface="Gautami"/>
+        <a:font script="Taml" typeface="Latha"/>
+        <a:font script="Syrc" typeface="Estrangelo Edessa"/>
+        <a:font script="Orya" typeface="Kalinga"/>
+        <a:font script="Mlym" typeface="Kartika"/>
+        <a:font script="Laoo" typeface="DokChampa"/>
+        <a:font script="Sinh" typeface="Iskoola Pota"/>
+        <a:font script="Mong" typeface="Mongolian Baiti"/>
+        <a:font script="Viet" typeface="Arial"/>
+        <a:font script="Uigh" typeface="Microsoft Uighur"/>
+        <a:font script="Geor" typeface="Sylfaen"/>
+      </a:minorFont>
+    </a:fontScheme>
+    <a:fmtScheme name="Office">
+      <a:fillStyleLst>
+        <a:solidFill>
+          <a:schemeClr val="phClr"/>
+        </a:solidFill>
+        <a:gradFill rotWithShape="1">
+          <a:gsLst>
+            <a:gs pos="0">
+              <a:schemeClr val="phClr">
+                <a:lumMod val="110000"/>
+                <a:satMod val="105000"/>
+                <a:tint val="67000"/>
+              </a:schemeClr>
+            </a:gs>
+            <a:gs pos="50000">
+              <a:schemeClr val="phClr">
+                <a:lumMod val="105000"/>
+                <a:satMod val="103000"/>
+                <a:tint val="73000"/>
+              </a:schemeClr>
+            </a:gs>
+            <a:gs pos="100000">
+              <a:schemeClr val="phClr">
+                <a:lumMod val="105000"/>
+                <a:satMod val="109000"/>
+                <a:tint val="81000"/>
+              </a:schemeClr>
+            </a:gs>
+          </a:gsLst>
+          <a:lin ang="5400000" scaled="0"/>
+        </a:gradFill>
+        <a:gradFill rotWithShape="1">
+          <a:gsLst>
+            <a:gs pos="0">
+              <a:schemeClr val="phClr">
+                <a:satMod val="103000"/>
+                <a:lumMod val="102000"/>
+                <a:tint val="94000"/>
+              </a:schemeClr>
+            </a:gs>
+            <a:gs pos="50000">
+              <a:schemeClr val="phClr">
+                <a:satMod val="110000"/>
+                <a:lumMod val="100000"/>
+                <a:shade val="100000"/>
+              </a:schemeClr>
+            </a:gs>
+            <a:gs pos="100000">
+              <a:schemeClr val="phClr">
+                <a:lumMod val="99000"/>
+                <a:satMod val="120000"/>
+                <a:shade val="78000"/>
+              </a:schemeClr>
+            </a:gs>
+          </a:gsLst>
+          <a:lin ang="5400000" scaled="0"/>
+        </a:gradFill>
+      </a:fillStyleLst>
+      <a:lnStyleLst>
+        <a:ln w="6350" cap="flat" cmpd="sng" algn="ctr">
+          <a:solidFill>
+            <a:schemeClr val="phClr"/>
+          </a:solidFill>
+          <a:prstDash val="solid"/>
+          <a:miter lim="800000"/>
+        </a:ln>
+        <a:ln w="12700" cap="flat" cmpd="sng" algn="ctr">
+          <a:solidFill>
+            <a:schemeClr val="phClr"/>
+          </a:solidFill>
+          <a:prstDash val="solid"/>
+          <a:miter lim="800000"/>
+        </a:ln>
+        <a:ln w="19050" cap="flat" cmpd="sng" algn="ctr">
+          <a:solidFill>
+            <a:schemeClr val="phClr"/>
+          </a:solidFill>
+          <a:prstDash val="solid"/>
+          <a:miter lim="800000"/>
+        </a:ln>
+      </a:lnStyleLst>
+      <a:effectStyleLst>
+        <a:effectStyle>
+          <a:effectLst/>
+        </a:effectStyle>
+        <a:effectStyle>
+          <a:effectLst/>
+        </a:effectStyle>
+        <a:effectStyle>
+          <a:effectLst>
+            <a:outerShdw blurRad="57150" dist="19050" dir="5400000" algn="ctr" rotWithShape="0">
+              <a:srgbClr val="000000">
+                <a:alpha val="63000"/>
+              </a:srgbClr>
+            </a:outerShdw>
+          </a:effectLst>
+        </a:effectStyle>
+      </a:effectStyleLst>
+      <a:bgFillStyleLst>
+        <a:solidFill>
+          <a:schemeClr val="phClr"/>
+        </a:solidFill>
+        <a:solidFill>
+          <a:schemeClr val="phClr">
+            <a:tint val="95000"/>
+            <a:satMod val="170000"/>
+          </a:schemeClr>
+        </a:solidFill>
+        <a:gradFill rotWithShape="1">
+          <a:gsLst>
+            <a:gs pos="0">
+              <a:schemeClr val="phClr">
+                <a:tint val="93000"/>
+                <a:satMod val="150000"/>
+                <a:shade val="98000"/>
+                <a:lumMod val="102000"/>
+              </a:schemeClr>
+            </a:gs>
+            <a:gs pos="50000">
+              <a:schemeClr val="phClr">
+                <a:tint val="98000"/>
+                <a:satMod val="130000"/>
+                <a:shade val="90000"/>
+                <a:lumMod val="103000"/>
+              </a:schemeClr>
+            </a:gs>
+            <a:gs pos="100000">
+              <a:schemeClr val="phClr">
+                <a:shade val="63000"/>
+                <a:satMod val="120000"/>
+              </a:schemeClr>
+            </a:gs>
+          </a:gsLst>
+          <a:lin ang="5400000" scaled="0"/>
+        </a:gradFill>
+      </a:bgFillStyleLst>
+    </a:fmtScheme>
+  </a:themeElements>
+  <a:objectDefaults/>
+  <a:extraClrSchemeLst/>
+  <a:extLst>
+    <a:ext uri="{05A4C25C-085E-4340-85A3-A5531E510DB2}">
+      <thm15:themeFamily xmlns:thm15="http://schemas.microsoft.com/office/thememl/2012/main" name="Office Theme" id="{62F939B6-93AF-4DB8-9C6B-D6C7DFDC589F}" vid="{4A3C46E8-61CC-4603-A589-7422A47A8E4A}"/>
+    </a:ext>
+  </a:extLst>
+</a:theme>
 </file>
</xml_diff>